<commit_message>
fix error in export data
</commit_message>
<xml_diff>
--- a/vignettes/figures/ottr.pptx
+++ b/vignettes/figures/ottr.pptx
@@ -6,8 +6,9 @@
   </p:sldMasterIdLst>
   <p:sldIdLst>
     <p:sldId id="256" r:id="rId2"/>
-    <p:sldId id="257" r:id="rId3"/>
-    <p:sldId id="258" r:id="rId4"/>
+    <p:sldId id="259" r:id="rId3"/>
+    <p:sldId id="257" r:id="rId4"/>
+    <p:sldId id="258" r:id="rId5"/>
   </p:sldIdLst>
   <p:sldSz cx="12192000" cy="6858000"/>
   <p:notesSz cx="6858000" cy="9144000"/>
@@ -3388,6 +3389,164 @@
 <file path=ppt/slides/slide2.xml><?xml version="1.0" encoding="utf-8"?>
 <p:sld xmlns:a="http://schemas.openxmlformats.org/drawingml/2006/main" xmlns:r="http://schemas.openxmlformats.org/officeDocument/2006/relationships" xmlns:p="http://schemas.openxmlformats.org/presentationml/2006/main">
   <p:cSld>
+    <p:bg>
+      <p:bgPr>
+        <a:solidFill>
+          <a:srgbClr val="CA225E"/>
+        </a:solidFill>
+        <a:effectLst/>
+      </p:bgPr>
+    </p:bg>
+    <p:spTree>
+      <p:nvGrpSpPr>
+        <p:cNvPr id="1" name=""/>
+        <p:cNvGrpSpPr/>
+        <p:nvPr/>
+      </p:nvGrpSpPr>
+      <p:grpSpPr>
+        <a:xfrm>
+          <a:off x="0" y="0"/>
+          <a:ext cx="0" cy="0"/>
+          <a:chOff x="0" y="0"/>
+          <a:chExt cx="0" cy="0"/>
+        </a:xfrm>
+      </p:grpSpPr>
+      <p:grpSp>
+        <p:nvGrpSpPr>
+          <p:cNvPr id="2" name="Gruppieren 1">
+            <a:extLst>
+              <a:ext uri="{FF2B5EF4-FFF2-40B4-BE49-F238E27FC236}">
+                <a16:creationId xmlns:a16="http://schemas.microsoft.com/office/drawing/2014/main" id="{1B17FBA2-E926-BBA0-1317-2AB5528AA1D2}"/>
+              </a:ext>
+            </a:extLst>
+          </p:cNvPr>
+          <p:cNvGrpSpPr/>
+          <p:nvPr/>
+        </p:nvGrpSpPr>
+        <p:grpSpPr>
+          <a:xfrm>
+            <a:off x="2538412" y="-564118"/>
+            <a:ext cx="6486525" cy="7272108"/>
+            <a:chOff x="2538412" y="-564118"/>
+            <a:chExt cx="6486525" cy="7272108"/>
+          </a:xfrm>
+        </p:grpSpPr>
+        <p:pic>
+          <p:nvPicPr>
+            <p:cNvPr id="3" name="Grafik 2" descr="Ein Bild, das Clipart, Cartoon enthält.&#10;&#10;Automatisch generierte Beschreibung">
+              <a:extLst>
+                <a:ext uri="{FF2B5EF4-FFF2-40B4-BE49-F238E27FC236}">
+                  <a16:creationId xmlns:a16="http://schemas.microsoft.com/office/drawing/2014/main" id="{9016FAC9-DD2C-EBD9-27F2-04DD60DDCFFD}"/>
+                </a:ext>
+              </a:extLst>
+            </p:cNvPr>
+            <p:cNvPicPr>
+              <a:picLocks noChangeAspect="1"/>
+            </p:cNvPicPr>
+            <p:nvPr/>
+          </p:nvPicPr>
+          <p:blipFill>
+            <a:blip r:embed="rId3">
+              <a:extLst>
+                <a:ext uri="{BEBA8EAE-BF5A-486C-A8C5-ECC9F3942E4B}">
+                  <a14:imgProps xmlns:a14="http://schemas.microsoft.com/office/drawing/2010/main">
+                    <a14:imgLayer r:embed="rId4">
+                      <a14:imgEffect>
+                        <a14:backgroundRemoval t="10000" b="90000" l="10000" r="90000">
+                          <a14:foregroundMark x1="43465" y1="22173" x2="43465" y2="22173"/>
+                          <a14:foregroundMark x1="43906" y1="20558" x2="43906" y2="20558"/>
+                          <a14:foregroundMark x1="44200" y1="19383" x2="44200" y2="19383"/>
+                          <a14:foregroundMark x1="54332" y1="15419" x2="54332" y2="15419"/>
+                          <a14:foregroundMark x1="51542" y1="18649" x2="51542" y2="18649"/>
+                        </a14:backgroundRemoval>
+                      </a14:imgEffect>
+                    </a14:imgLayer>
+                  </a14:imgProps>
+                </a:ext>
+                <a:ext uri="{28A0092B-C50C-407E-A947-70E740481C1C}">
+                  <a14:useLocalDpi xmlns:a14="http://schemas.microsoft.com/office/drawing/2010/main" val="0"/>
+                </a:ext>
+              </a:extLst>
+            </a:blip>
+            <a:stretch>
+              <a:fillRect/>
+            </a:stretch>
+          </p:blipFill>
+          <p:spPr>
+            <a:xfrm>
+              <a:off x="2538412" y="-564118"/>
+              <a:ext cx="6486525" cy="6486525"/>
+            </a:xfrm>
+            <a:prstGeom prst="rect">
+              <a:avLst/>
+            </a:prstGeom>
+          </p:spPr>
+        </p:pic>
+        <p:sp>
+          <p:nvSpPr>
+            <p:cNvPr id="4" name="Textfeld 3">
+              <a:extLst>
+                <a:ext uri="{FF2B5EF4-FFF2-40B4-BE49-F238E27FC236}">
+                  <a16:creationId xmlns:a16="http://schemas.microsoft.com/office/drawing/2014/main" id="{374F39C0-6B94-FEB5-F8DD-45ABD8EDDBB4}"/>
+                </a:ext>
+              </a:extLst>
+            </p:cNvPr>
+            <p:cNvSpPr txBox="1"/>
+            <p:nvPr/>
+          </p:nvSpPr>
+          <p:spPr>
+            <a:xfrm>
+              <a:off x="3888945" y="4845942"/>
+              <a:ext cx="3785457" cy="1862048"/>
+            </a:xfrm>
+            <a:prstGeom prst="rect">
+              <a:avLst/>
+            </a:prstGeom>
+            <a:noFill/>
+          </p:spPr>
+          <p:txBody>
+            <a:bodyPr wrap="square" rtlCol="0">
+              <a:spAutoFit/>
+            </a:bodyPr>
+            <a:lstStyle/>
+            <a:p>
+              <a:r>
+                <a:rPr lang="de-DE" sz="11500" dirty="0" err="1">
+                  <a:solidFill>
+                    <a:schemeClr val="bg1"/>
+                  </a:solidFill>
+                  <a:latin typeface="Amasis MT Pro Black" panose="020F0502020204030204" pitchFamily="18" charset="0"/>
+                  <a:cs typeface="Aparajita" panose="020B0502040204020203" pitchFamily="18" charset="0"/>
+                </a:rPr>
+                <a:t>otter</a:t>
+              </a:r>
+              <a:endParaRPr lang="de-DE" sz="8800" dirty="0">
+                <a:solidFill>
+                  <a:schemeClr val="bg1"/>
+                </a:solidFill>
+                <a:latin typeface="Amasis MT Pro Black" panose="020F0502020204030204" pitchFamily="18" charset="0"/>
+                <a:cs typeface="Aparajita" panose="020B0502040204020203" pitchFamily="18" charset="0"/>
+              </a:endParaRPr>
+            </a:p>
+          </p:txBody>
+        </p:sp>
+      </p:grpSp>
+    </p:spTree>
+    <p:extLst>
+      <p:ext uri="{BB962C8B-B14F-4D97-AF65-F5344CB8AC3E}">
+        <p14:creationId xmlns:p14="http://schemas.microsoft.com/office/powerpoint/2010/main" val="2928880415"/>
+      </p:ext>
+    </p:extLst>
+  </p:cSld>
+  <p:clrMapOvr>
+    <a:overrideClrMapping bg1="lt1" tx1="dk1" bg2="lt2" tx2="dk2" accent1="accent1" accent2="accent2" accent3="accent3" accent4="accent4" accent5="accent5" accent6="accent6" hlink="hlink" folHlink="folHlink"/>
+  </p:clrMapOvr>
+</p:sld>
+</file>
+
+<file path=ppt/slides/slide3.xml><?xml version="1.0" encoding="utf-8"?>
+<p:sld xmlns:a="http://schemas.openxmlformats.org/drawingml/2006/main" xmlns:r="http://schemas.openxmlformats.org/officeDocument/2006/relationships" xmlns:p="http://schemas.openxmlformats.org/presentationml/2006/main">
+  <p:cSld>
     <p:spTree>
       <p:nvGrpSpPr>
         <p:cNvPr id="1" name=""/>
@@ -3535,7 +3694,7 @@
 </p:sld>
 </file>
 
-<file path=ppt/slides/slide3.xml><?xml version="1.0" encoding="utf-8"?>
+<file path=ppt/slides/slide4.xml><?xml version="1.0" encoding="utf-8"?>
 <p:sld xmlns:a="http://schemas.openxmlformats.org/drawingml/2006/main" xmlns:r="http://schemas.openxmlformats.org/officeDocument/2006/relationships" xmlns:p="http://schemas.openxmlformats.org/presentationml/2006/main">
   <p:cSld>
     <p:spTree>
@@ -3567,9 +3726,9 @@
         <p:grpSpPr>
           <a:xfrm>
             <a:off x="2538412" y="-564118"/>
-            <a:ext cx="6486525" cy="7594520"/>
+            <a:ext cx="6486525" cy="7272108"/>
             <a:chOff x="2538412" y="-564118"/>
-            <a:chExt cx="6486525" cy="7594520"/>
+            <a:chExt cx="6486525" cy="7272108"/>
           </a:xfrm>
         </p:grpSpPr>
         <p:pic>
@@ -3637,8 +3796,8 @@
           </p:nvSpPr>
           <p:spPr>
             <a:xfrm>
-              <a:off x="3254740" y="4814411"/>
-              <a:ext cx="5053867" cy="2215991"/>
+              <a:off x="3888945" y="4845942"/>
+              <a:ext cx="3785457" cy="1862048"/>
             </a:xfrm>
             <a:prstGeom prst="rect">
               <a:avLst/>
@@ -3652,16 +3811,16 @@
             <a:lstStyle/>
             <a:p>
               <a:r>
-                <a:rPr lang="de-DE" sz="13800" dirty="0" err="1">
+                <a:rPr lang="de-DE" sz="11500" dirty="0" err="1">
                   <a:solidFill>
                     <a:srgbClr val="CA225E"/>
                   </a:solidFill>
                   <a:latin typeface="Amasis MT Pro Black" panose="020F0502020204030204" pitchFamily="18" charset="0"/>
                   <a:cs typeface="Aparajita" panose="020B0502040204020203" pitchFamily="18" charset="0"/>
                 </a:rPr>
-                <a:t>otteR</a:t>
+                <a:t>otter</a:t>
               </a:r>
-              <a:endParaRPr lang="de-DE" sz="9600" dirty="0">
+              <a:endParaRPr lang="de-DE" sz="8800" dirty="0">
                 <a:solidFill>
                   <a:srgbClr val="CA225E"/>
                 </a:solidFill>
@@ -3978,4 +4137,47 @@
     </a:ext>
   </a:extLst>
 </a:theme>
+</file>
+
+<file path=ppt/theme/themeOverride1.xml><?xml version="1.0" encoding="utf-8"?>
+<a:themeOverride xmlns:a="http://schemas.openxmlformats.org/drawingml/2006/main">
+  <a:clrScheme name="Office">
+    <a:dk1>
+      <a:sysClr val="windowText" lastClr="000000"/>
+    </a:dk1>
+    <a:lt1>
+      <a:sysClr val="window" lastClr="FFFFFF"/>
+    </a:lt1>
+    <a:dk2>
+      <a:srgbClr val="44546A"/>
+    </a:dk2>
+    <a:lt2>
+      <a:srgbClr val="E7E6E6"/>
+    </a:lt2>
+    <a:accent1>
+      <a:srgbClr val="4472C4"/>
+    </a:accent1>
+    <a:accent2>
+      <a:srgbClr val="ED7D31"/>
+    </a:accent2>
+    <a:accent3>
+      <a:srgbClr val="A5A5A5"/>
+    </a:accent3>
+    <a:accent4>
+      <a:srgbClr val="FFC000"/>
+    </a:accent4>
+    <a:accent5>
+      <a:srgbClr val="5B9BD5"/>
+    </a:accent5>
+    <a:accent6>
+      <a:srgbClr val="70AD47"/>
+    </a:accent6>
+    <a:hlink>
+      <a:srgbClr val="0563C1"/>
+    </a:hlink>
+    <a:folHlink>
+      <a:srgbClr val="954F72"/>
+    </a:folHlink>
+  </a:clrScheme>
+</a:themeOverride>
 </file>
</xml_diff>